<commit_message>
sample source 04 commit (6장 끝)
</commit_message>
<xml_diff>
--- a/hibernate_study/doc/JPA 세미나 발표 자료.pptx
+++ b/hibernate_study/doc/JPA 세미나 발표 자료.pptx
@@ -19,7 +19,11 @@
     <p:sldId id="267" r:id="rId13"/>
     <p:sldId id="268" r:id="rId14"/>
     <p:sldId id="269" r:id="rId15"/>
-    <p:sldId id="270" r:id="rId16"/>
+    <p:sldId id="271" r:id="rId16"/>
+    <p:sldId id="272" r:id="rId17"/>
+    <p:sldId id="273" r:id="rId18"/>
+    <p:sldId id="274" r:id="rId19"/>
+    <p:sldId id="270" r:id="rId20"/>
   </p:sldIdLst>
   <p:sldSz cx="12192000" cy="6858000"/>
   <p:notesSz cx="6858000" cy="9144000"/>
@@ -119,6 +123,33 @@
     </a:lvl9pPr>
   </p:defaultTextStyle>
   <p:extLst>
+    <p:ext uri="{521415D9-36F7-43E2-AB2F-B90AF26B5E84}">
+      <p14:sectionLst xmlns:p14="http://schemas.microsoft.com/office/powerpoint/2010/main">
+        <p14:section name="기본 구역" id="{07125F0E-4867-456A-BF8C-FB6114D6620C}">
+          <p14:sldIdLst>
+            <p14:sldId id="256"/>
+            <p14:sldId id="257"/>
+            <p14:sldId id="258"/>
+            <p14:sldId id="259"/>
+            <p14:sldId id="260"/>
+            <p14:sldId id="261"/>
+            <p14:sldId id="262"/>
+            <p14:sldId id="264"/>
+            <p14:sldId id="263"/>
+            <p14:sldId id="265"/>
+            <p14:sldId id="266"/>
+            <p14:sldId id="267"/>
+            <p14:sldId id="268"/>
+            <p14:sldId id="269"/>
+            <p14:sldId id="271"/>
+            <p14:sldId id="272"/>
+            <p14:sldId id="273"/>
+            <p14:sldId id="274"/>
+            <p14:sldId id="270"/>
+          </p14:sldIdLst>
+        </p14:section>
+      </p14:sectionLst>
+    </p:ext>
     <p:ext uri="{EFAFB233-063F-42B5-8137-9DF3F51BA10A}">
       <p15:sldGuideLst xmlns:p15="http://schemas.microsoft.com/office/powerpoint/2012/main"/>
     </p:ext>
@@ -257,7 +288,7 @@
           <a:p>
             <a:fld id="{A1638A2E-97FC-4CB1-8782-95EBA7F569A9}" type="datetimeFigureOut">
               <a:rPr lang="ko-KR" altLang="en-US" smtClean="0"/>
-              <a:t>2016-10-11</a:t>
+              <a:t>2016-10-14</a:t>
             </a:fld>
             <a:endParaRPr lang="ko-KR" altLang="en-US"/>
           </a:p>
@@ -427,7 +458,7 @@
           <a:p>
             <a:fld id="{A1638A2E-97FC-4CB1-8782-95EBA7F569A9}" type="datetimeFigureOut">
               <a:rPr lang="ko-KR" altLang="en-US" smtClean="0"/>
-              <a:t>2016-10-11</a:t>
+              <a:t>2016-10-14</a:t>
             </a:fld>
             <a:endParaRPr lang="ko-KR" altLang="en-US"/>
           </a:p>
@@ -607,7 +638,7 @@
           <a:p>
             <a:fld id="{A1638A2E-97FC-4CB1-8782-95EBA7F569A9}" type="datetimeFigureOut">
               <a:rPr lang="ko-KR" altLang="en-US" smtClean="0"/>
-              <a:t>2016-10-11</a:t>
+              <a:t>2016-10-14</a:t>
             </a:fld>
             <a:endParaRPr lang="ko-KR" altLang="en-US"/>
           </a:p>
@@ -777,7 +808,7 @@
           <a:p>
             <a:fld id="{A1638A2E-97FC-4CB1-8782-95EBA7F569A9}" type="datetimeFigureOut">
               <a:rPr lang="ko-KR" altLang="en-US" smtClean="0"/>
-              <a:t>2016-10-11</a:t>
+              <a:t>2016-10-14</a:t>
             </a:fld>
             <a:endParaRPr lang="ko-KR" altLang="en-US"/>
           </a:p>
@@ -1023,7 +1054,7 @@
           <a:p>
             <a:fld id="{A1638A2E-97FC-4CB1-8782-95EBA7F569A9}" type="datetimeFigureOut">
               <a:rPr lang="ko-KR" altLang="en-US" smtClean="0"/>
-              <a:t>2016-10-11</a:t>
+              <a:t>2016-10-14</a:t>
             </a:fld>
             <a:endParaRPr lang="ko-KR" altLang="en-US"/>
           </a:p>
@@ -1255,7 +1286,7 @@
           <a:p>
             <a:fld id="{A1638A2E-97FC-4CB1-8782-95EBA7F569A9}" type="datetimeFigureOut">
               <a:rPr lang="ko-KR" altLang="en-US" smtClean="0"/>
-              <a:t>2016-10-11</a:t>
+              <a:t>2016-10-14</a:t>
             </a:fld>
             <a:endParaRPr lang="ko-KR" altLang="en-US"/>
           </a:p>
@@ -1622,7 +1653,7 @@
           <a:p>
             <a:fld id="{A1638A2E-97FC-4CB1-8782-95EBA7F569A9}" type="datetimeFigureOut">
               <a:rPr lang="ko-KR" altLang="en-US" smtClean="0"/>
-              <a:t>2016-10-11</a:t>
+              <a:t>2016-10-14</a:t>
             </a:fld>
             <a:endParaRPr lang="ko-KR" altLang="en-US"/>
           </a:p>
@@ -1740,7 +1771,7 @@
           <a:p>
             <a:fld id="{A1638A2E-97FC-4CB1-8782-95EBA7F569A9}" type="datetimeFigureOut">
               <a:rPr lang="ko-KR" altLang="en-US" smtClean="0"/>
-              <a:t>2016-10-11</a:t>
+              <a:t>2016-10-14</a:t>
             </a:fld>
             <a:endParaRPr lang="ko-KR" altLang="en-US"/>
           </a:p>
@@ -1835,7 +1866,7 @@
           <a:p>
             <a:fld id="{A1638A2E-97FC-4CB1-8782-95EBA7F569A9}" type="datetimeFigureOut">
               <a:rPr lang="ko-KR" altLang="en-US" smtClean="0"/>
-              <a:t>2016-10-11</a:t>
+              <a:t>2016-10-14</a:t>
             </a:fld>
             <a:endParaRPr lang="ko-KR" altLang="en-US"/>
           </a:p>
@@ -2112,7 +2143,7 @@
           <a:p>
             <a:fld id="{A1638A2E-97FC-4CB1-8782-95EBA7F569A9}" type="datetimeFigureOut">
               <a:rPr lang="ko-KR" altLang="en-US" smtClean="0"/>
-              <a:t>2016-10-11</a:t>
+              <a:t>2016-10-14</a:t>
             </a:fld>
             <a:endParaRPr lang="ko-KR" altLang="en-US"/>
           </a:p>
@@ -2365,7 +2396,7 @@
           <a:p>
             <a:fld id="{A1638A2E-97FC-4CB1-8782-95EBA7F569A9}" type="datetimeFigureOut">
               <a:rPr lang="ko-KR" altLang="en-US" smtClean="0"/>
-              <a:t>2016-10-11</a:t>
+              <a:t>2016-10-14</a:t>
             </a:fld>
             <a:endParaRPr lang="ko-KR" altLang="en-US"/>
           </a:p>
@@ -2578,7 +2609,7 @@
           <a:p>
             <a:fld id="{A1638A2E-97FC-4CB1-8782-95EBA7F569A9}" type="datetimeFigureOut">
               <a:rPr lang="ko-KR" altLang="en-US" smtClean="0"/>
-              <a:t>2016-10-11</a:t>
+              <a:t>2016-10-14</a:t>
             </a:fld>
             <a:endParaRPr lang="ko-KR" altLang="en-US"/>
           </a:p>
@@ -4120,6 +4151,2222 @@
 </file>
 
 <file path=ppt/slides/slide15.xml><?xml version="1.0" encoding="utf-8"?>
+<p:sld xmlns:a="http://schemas.openxmlformats.org/drawingml/2006/main" xmlns:r="http://schemas.openxmlformats.org/officeDocument/2006/relationships" xmlns:p="http://schemas.openxmlformats.org/presentationml/2006/main">
+  <p:cSld>
+    <p:spTree>
+      <p:nvGrpSpPr>
+        <p:cNvPr id="1" name=""/>
+        <p:cNvGrpSpPr/>
+        <p:nvPr/>
+      </p:nvGrpSpPr>
+      <p:grpSpPr>
+        <a:xfrm>
+          <a:off x="0" y="0"/>
+          <a:ext cx="0" cy="0"/>
+          <a:chOff x="0" y="0"/>
+          <a:chExt cx="0" cy="0"/>
+        </a:xfrm>
+      </p:grpSpPr>
+      <p:sp>
+        <p:nvSpPr>
+          <p:cNvPr id="4" name="TextBox 3"/>
+          <p:cNvSpPr txBox="1"/>
+          <p:nvPr/>
+        </p:nvSpPr>
+        <p:spPr>
+          <a:xfrm>
+            <a:off x="307024" y="307025"/>
+            <a:ext cx="4039888" cy="369332"/>
+          </a:xfrm>
+          <a:prstGeom prst="rect">
+            <a:avLst/>
+          </a:prstGeom>
+          <a:noFill/>
+        </p:spPr>
+        <p:txBody>
+          <a:bodyPr wrap="none" rtlCol="0">
+            <a:spAutoFit/>
+          </a:bodyPr>
+          <a:lstStyle/>
+          <a:p>
+            <a:r>
+              <a:rPr lang="ko-KR" altLang="en-US" smtClean="0"/>
+              <a:t>네번째 실습</a:t>
+            </a:r>
+            <a:r>
+              <a:rPr lang="en-US" altLang="ko-KR" smtClean="0"/>
+              <a:t>, </a:t>
+            </a:r>
+            <a:r>
+              <a:rPr lang="ko-KR" altLang="en-US" smtClean="0"/>
+              <a:t>더 복잡해진 관계 </a:t>
+            </a:r>
+            <a:r>
+              <a:rPr lang="en-US" altLang="ko-KR" smtClean="0"/>
+              <a:t>(UML)</a:t>
+            </a:r>
+            <a:endParaRPr lang="ko-KR" altLang="en-US"/>
+          </a:p>
+        </p:txBody>
+      </p:sp>
+      <p:sp>
+        <p:nvSpPr>
+          <p:cNvPr id="3" name="직사각형 2"/>
+          <p:cNvSpPr/>
+          <p:nvPr/>
+        </p:nvSpPr>
+        <p:spPr>
+          <a:xfrm>
+            <a:off x="4420993" y="2214748"/>
+            <a:ext cx="1258784" cy="385948"/>
+          </a:xfrm>
+          <a:prstGeom prst="rect">
+            <a:avLst/>
+          </a:prstGeom>
+        </p:spPr>
+        <p:style>
+          <a:lnRef idx="2">
+            <a:schemeClr val="dk1"/>
+          </a:lnRef>
+          <a:fillRef idx="1">
+            <a:schemeClr val="lt1"/>
+          </a:fillRef>
+          <a:effectRef idx="0">
+            <a:schemeClr val="dk1"/>
+          </a:effectRef>
+          <a:fontRef idx="minor">
+            <a:schemeClr val="dk1"/>
+          </a:fontRef>
+        </p:style>
+        <p:txBody>
+          <a:bodyPr rtlCol="0" anchor="ctr"/>
+          <a:lstStyle/>
+          <a:p>
+            <a:pPr algn="ctr"/>
+            <a:r>
+              <a:rPr lang="en-US" altLang="ko-KR" smtClean="0"/>
+              <a:t>Member</a:t>
+            </a:r>
+            <a:endParaRPr lang="ko-KR" altLang="en-US"/>
+          </a:p>
+        </p:txBody>
+      </p:sp>
+      <p:sp>
+        <p:nvSpPr>
+          <p:cNvPr id="6" name="직사각형 5"/>
+          <p:cNvSpPr/>
+          <p:nvPr/>
+        </p:nvSpPr>
+        <p:spPr>
+          <a:xfrm>
+            <a:off x="1529343" y="2214748"/>
+            <a:ext cx="1843250" cy="385948"/>
+          </a:xfrm>
+          <a:prstGeom prst="rect">
+            <a:avLst/>
+          </a:prstGeom>
+        </p:spPr>
+        <p:style>
+          <a:lnRef idx="2">
+            <a:schemeClr val="dk1"/>
+          </a:lnRef>
+          <a:fillRef idx="1">
+            <a:schemeClr val="lt1"/>
+          </a:fillRef>
+          <a:effectRef idx="0">
+            <a:schemeClr val="dk1"/>
+          </a:effectRef>
+          <a:fontRef idx="minor">
+            <a:schemeClr val="dk1"/>
+          </a:fontRef>
+        </p:style>
+        <p:txBody>
+          <a:bodyPr rtlCol="0" anchor="ctr"/>
+          <a:lstStyle/>
+          <a:p>
+            <a:pPr algn="ctr"/>
+            <a:r>
+              <a:rPr lang="en-US" altLang="ko-KR" smtClean="0"/>
+              <a:t>MemberDetail</a:t>
+            </a:r>
+            <a:endParaRPr lang="ko-KR" altLang="en-US"/>
+          </a:p>
+        </p:txBody>
+      </p:sp>
+      <p:sp>
+        <p:nvSpPr>
+          <p:cNvPr id="7" name="직사각형 6"/>
+          <p:cNvSpPr/>
+          <p:nvPr/>
+        </p:nvSpPr>
+        <p:spPr>
+          <a:xfrm>
+            <a:off x="9251692" y="2214748"/>
+            <a:ext cx="1258784" cy="385948"/>
+          </a:xfrm>
+          <a:prstGeom prst="rect">
+            <a:avLst/>
+          </a:prstGeom>
+        </p:spPr>
+        <p:style>
+          <a:lnRef idx="2">
+            <a:schemeClr val="dk1"/>
+          </a:lnRef>
+          <a:fillRef idx="1">
+            <a:schemeClr val="lt1"/>
+          </a:fillRef>
+          <a:effectRef idx="0">
+            <a:schemeClr val="dk1"/>
+          </a:effectRef>
+          <a:fontRef idx="minor">
+            <a:schemeClr val="dk1"/>
+          </a:fontRef>
+        </p:style>
+        <p:txBody>
+          <a:bodyPr rtlCol="0" anchor="ctr"/>
+          <a:lstStyle/>
+          <a:p>
+            <a:pPr algn="ctr"/>
+            <a:r>
+              <a:rPr lang="en-US" altLang="ko-KR" smtClean="0"/>
+              <a:t>Article</a:t>
+            </a:r>
+            <a:endParaRPr lang="ko-KR" altLang="en-US"/>
+          </a:p>
+        </p:txBody>
+      </p:sp>
+      <p:sp>
+        <p:nvSpPr>
+          <p:cNvPr id="8" name="직사각형 7"/>
+          <p:cNvSpPr/>
+          <p:nvPr/>
+        </p:nvSpPr>
+        <p:spPr>
+          <a:xfrm>
+            <a:off x="6728177" y="2214748"/>
+            <a:ext cx="1475115" cy="385948"/>
+          </a:xfrm>
+          <a:prstGeom prst="rect">
+            <a:avLst/>
+          </a:prstGeom>
+        </p:spPr>
+        <p:style>
+          <a:lnRef idx="2">
+            <a:schemeClr val="dk1"/>
+          </a:lnRef>
+          <a:fillRef idx="1">
+            <a:schemeClr val="lt1"/>
+          </a:fillRef>
+          <a:effectRef idx="0">
+            <a:schemeClr val="dk1"/>
+          </a:effectRef>
+          <a:fontRef idx="minor">
+            <a:schemeClr val="dk1"/>
+          </a:fontRef>
+        </p:style>
+        <p:txBody>
+          <a:bodyPr rtlCol="0" anchor="ctr"/>
+          <a:lstStyle/>
+          <a:p>
+            <a:pPr algn="ctr"/>
+            <a:r>
+              <a:rPr lang="en-US" altLang="ko-KR" smtClean="0"/>
+              <a:t>Comments</a:t>
+            </a:r>
+            <a:endParaRPr lang="ko-KR" altLang="en-US"/>
+          </a:p>
+        </p:txBody>
+      </p:sp>
+      <p:cxnSp>
+        <p:nvCxnSpPr>
+          <p:cNvPr id="10" name="직선 연결선 9"/>
+          <p:cNvCxnSpPr>
+            <a:stCxn id="6" idx="3"/>
+            <a:endCxn id="3" idx="1"/>
+          </p:cNvCxnSpPr>
+          <p:nvPr/>
+        </p:nvCxnSpPr>
+        <p:spPr>
+          <a:xfrm>
+            <a:off x="3372593" y="2407722"/>
+            <a:ext cx="1048400" cy="0"/>
+          </a:xfrm>
+          <a:prstGeom prst="line">
+            <a:avLst/>
+          </a:prstGeom>
+          <a:ln w="12700"/>
+        </p:spPr>
+        <p:style>
+          <a:lnRef idx="1">
+            <a:schemeClr val="dk1"/>
+          </a:lnRef>
+          <a:fillRef idx="0">
+            <a:schemeClr val="dk1"/>
+          </a:fillRef>
+          <a:effectRef idx="0">
+            <a:schemeClr val="dk1"/>
+          </a:effectRef>
+          <a:fontRef idx="minor">
+            <a:schemeClr val="tx1"/>
+          </a:fontRef>
+        </p:style>
+      </p:cxnSp>
+      <p:cxnSp>
+        <p:nvCxnSpPr>
+          <p:cNvPr id="11" name="직선 연결선 10"/>
+          <p:cNvCxnSpPr>
+            <a:stCxn id="3" idx="3"/>
+            <a:endCxn id="8" idx="1"/>
+          </p:cNvCxnSpPr>
+          <p:nvPr/>
+        </p:nvCxnSpPr>
+        <p:spPr>
+          <a:xfrm>
+            <a:off x="5679777" y="2407722"/>
+            <a:ext cx="1048400" cy="0"/>
+          </a:xfrm>
+          <a:prstGeom prst="line">
+            <a:avLst/>
+          </a:prstGeom>
+          <a:ln w="12700"/>
+        </p:spPr>
+        <p:style>
+          <a:lnRef idx="1">
+            <a:schemeClr val="dk1"/>
+          </a:lnRef>
+          <a:fillRef idx="0">
+            <a:schemeClr val="dk1"/>
+          </a:fillRef>
+          <a:effectRef idx="0">
+            <a:schemeClr val="dk1"/>
+          </a:effectRef>
+          <a:fontRef idx="minor">
+            <a:schemeClr val="tx1"/>
+          </a:fontRef>
+        </p:style>
+      </p:cxnSp>
+      <p:cxnSp>
+        <p:nvCxnSpPr>
+          <p:cNvPr id="14" name="직선 연결선 13"/>
+          <p:cNvCxnSpPr>
+            <a:stCxn id="8" idx="3"/>
+            <a:endCxn id="7" idx="1"/>
+          </p:cNvCxnSpPr>
+          <p:nvPr/>
+        </p:nvCxnSpPr>
+        <p:spPr>
+          <a:xfrm>
+            <a:off x="8203292" y="2407722"/>
+            <a:ext cx="1048400" cy="0"/>
+          </a:xfrm>
+          <a:prstGeom prst="line">
+            <a:avLst/>
+          </a:prstGeom>
+          <a:ln w="12700"/>
+        </p:spPr>
+        <p:style>
+          <a:lnRef idx="1">
+            <a:schemeClr val="dk1"/>
+          </a:lnRef>
+          <a:fillRef idx="0">
+            <a:schemeClr val="dk1"/>
+          </a:fillRef>
+          <a:effectRef idx="0">
+            <a:schemeClr val="dk1"/>
+          </a:effectRef>
+          <a:fontRef idx="minor">
+            <a:schemeClr val="tx1"/>
+          </a:fontRef>
+        </p:style>
+      </p:cxnSp>
+    </p:spTree>
+    <p:extLst>
+      <p:ext uri="{BB962C8B-B14F-4D97-AF65-F5344CB8AC3E}">
+        <p14:creationId xmlns:p14="http://schemas.microsoft.com/office/powerpoint/2010/main" val="326085017"/>
+      </p:ext>
+    </p:extLst>
+  </p:cSld>
+  <p:clrMapOvr>
+    <a:masterClrMapping/>
+  </p:clrMapOvr>
+  <p:timing>
+    <p:tnLst>
+      <p:par>
+        <p:cTn id="1" dur="indefinite" restart="never" nodeType="tmRoot"/>
+      </p:par>
+    </p:tnLst>
+  </p:timing>
+</p:sld>
+</file>
+
+<file path=ppt/slides/slide16.xml><?xml version="1.0" encoding="utf-8"?>
+<p:sld xmlns:a="http://schemas.openxmlformats.org/drawingml/2006/main" xmlns:r="http://schemas.openxmlformats.org/officeDocument/2006/relationships" xmlns:p="http://schemas.openxmlformats.org/presentationml/2006/main">
+  <p:cSld>
+    <p:spTree>
+      <p:nvGrpSpPr>
+        <p:cNvPr id="1" name=""/>
+        <p:cNvGrpSpPr/>
+        <p:nvPr/>
+      </p:nvGrpSpPr>
+      <p:grpSpPr>
+        <a:xfrm>
+          <a:off x="0" y="0"/>
+          <a:ext cx="0" cy="0"/>
+          <a:chOff x="0" y="0"/>
+          <a:chExt cx="0" cy="0"/>
+        </a:xfrm>
+      </p:grpSpPr>
+      <p:sp>
+        <p:nvSpPr>
+          <p:cNvPr id="4" name="TextBox 3"/>
+          <p:cNvSpPr txBox="1"/>
+          <p:nvPr/>
+        </p:nvSpPr>
+        <p:spPr>
+          <a:xfrm>
+            <a:off x="307024" y="307025"/>
+            <a:ext cx="4248279" cy="369332"/>
+          </a:xfrm>
+          <a:prstGeom prst="rect">
+            <a:avLst/>
+          </a:prstGeom>
+          <a:noFill/>
+        </p:spPr>
+        <p:txBody>
+          <a:bodyPr wrap="none" rtlCol="0">
+            <a:spAutoFit/>
+          </a:bodyPr>
+          <a:lstStyle/>
+          <a:p>
+            <a:r>
+              <a:rPr lang="ko-KR" altLang="en-US" smtClean="0"/>
+              <a:t>네번째 실습</a:t>
+            </a:r>
+            <a:r>
+              <a:rPr lang="en-US" altLang="ko-KR" smtClean="0"/>
+              <a:t>, </a:t>
+            </a:r>
+            <a:r>
+              <a:rPr lang="ko-KR" altLang="en-US" smtClean="0"/>
+              <a:t>더 복잡해진 관계 </a:t>
+            </a:r>
+            <a:r>
+              <a:rPr lang="en-US" altLang="ko-KR" smtClean="0"/>
+              <a:t>(</a:t>
+            </a:r>
+            <a:r>
+              <a:rPr lang="ko-KR" altLang="en-US" smtClean="0"/>
+              <a:t>테이블</a:t>
+            </a:r>
+            <a:r>
+              <a:rPr lang="en-US" altLang="ko-KR" smtClean="0"/>
+              <a:t>)</a:t>
+            </a:r>
+            <a:endParaRPr lang="ko-KR" altLang="en-US"/>
+          </a:p>
+        </p:txBody>
+      </p:sp>
+      <p:sp>
+        <p:nvSpPr>
+          <p:cNvPr id="3" name="직사각형 2"/>
+          <p:cNvSpPr/>
+          <p:nvPr/>
+        </p:nvSpPr>
+        <p:spPr>
+          <a:xfrm>
+            <a:off x="3999418" y="2084118"/>
+            <a:ext cx="1258784" cy="385948"/>
+          </a:xfrm>
+          <a:prstGeom prst="rect">
+            <a:avLst/>
+          </a:prstGeom>
+        </p:spPr>
+        <p:style>
+          <a:lnRef idx="2">
+            <a:schemeClr val="dk1"/>
+          </a:lnRef>
+          <a:fillRef idx="1">
+            <a:schemeClr val="lt1"/>
+          </a:fillRef>
+          <a:effectRef idx="0">
+            <a:schemeClr val="dk1"/>
+          </a:effectRef>
+          <a:fontRef idx="minor">
+            <a:schemeClr val="dk1"/>
+          </a:fontRef>
+        </p:style>
+        <p:txBody>
+          <a:bodyPr rtlCol="0" anchor="ctr"/>
+          <a:lstStyle/>
+          <a:p>
+            <a:pPr algn="ctr"/>
+            <a:r>
+              <a:rPr lang="en-US" altLang="ko-KR" smtClean="0"/>
+              <a:t>MEMBER</a:t>
+            </a:r>
+            <a:endParaRPr lang="ko-KR" altLang="en-US"/>
+          </a:p>
+        </p:txBody>
+      </p:sp>
+      <p:sp>
+        <p:nvSpPr>
+          <p:cNvPr id="6" name="직사각형 5"/>
+          <p:cNvSpPr/>
+          <p:nvPr/>
+        </p:nvSpPr>
+        <p:spPr>
+          <a:xfrm>
+            <a:off x="994952" y="2084118"/>
+            <a:ext cx="1956066" cy="385948"/>
+          </a:xfrm>
+          <a:prstGeom prst="rect">
+            <a:avLst/>
+          </a:prstGeom>
+        </p:spPr>
+        <p:style>
+          <a:lnRef idx="2">
+            <a:schemeClr val="dk1"/>
+          </a:lnRef>
+          <a:fillRef idx="1">
+            <a:schemeClr val="lt1"/>
+          </a:fillRef>
+          <a:effectRef idx="0">
+            <a:schemeClr val="dk1"/>
+          </a:effectRef>
+          <a:fontRef idx="minor">
+            <a:schemeClr val="dk1"/>
+          </a:fontRef>
+        </p:style>
+        <p:txBody>
+          <a:bodyPr rtlCol="0" anchor="ctr"/>
+          <a:lstStyle/>
+          <a:p>
+            <a:pPr algn="ctr"/>
+            <a:r>
+              <a:rPr lang="en-US" altLang="ko-KR" smtClean="0"/>
+              <a:t>MEMBER_DETAIL</a:t>
+            </a:r>
+            <a:endParaRPr lang="ko-KR" altLang="en-US"/>
+          </a:p>
+        </p:txBody>
+      </p:sp>
+      <p:sp>
+        <p:nvSpPr>
+          <p:cNvPr id="7" name="직사각형 6"/>
+          <p:cNvSpPr/>
+          <p:nvPr/>
+        </p:nvSpPr>
+        <p:spPr>
+          <a:xfrm>
+            <a:off x="8830117" y="2084118"/>
+            <a:ext cx="1258784" cy="385948"/>
+          </a:xfrm>
+          <a:prstGeom prst="rect">
+            <a:avLst/>
+          </a:prstGeom>
+        </p:spPr>
+        <p:style>
+          <a:lnRef idx="2">
+            <a:schemeClr val="dk1"/>
+          </a:lnRef>
+          <a:fillRef idx="1">
+            <a:schemeClr val="lt1"/>
+          </a:fillRef>
+          <a:effectRef idx="0">
+            <a:schemeClr val="dk1"/>
+          </a:effectRef>
+          <a:fontRef idx="minor">
+            <a:schemeClr val="dk1"/>
+          </a:fontRef>
+        </p:style>
+        <p:txBody>
+          <a:bodyPr rtlCol="0" anchor="ctr"/>
+          <a:lstStyle/>
+          <a:p>
+            <a:pPr algn="ctr"/>
+            <a:r>
+              <a:rPr lang="en-US" altLang="ko-KR" smtClean="0"/>
+              <a:t>ARTICLE</a:t>
+            </a:r>
+            <a:endParaRPr lang="ko-KR" altLang="en-US"/>
+          </a:p>
+        </p:txBody>
+      </p:sp>
+      <p:sp>
+        <p:nvSpPr>
+          <p:cNvPr id="8" name="직사각형 7"/>
+          <p:cNvSpPr/>
+          <p:nvPr/>
+        </p:nvSpPr>
+        <p:spPr>
+          <a:xfrm>
+            <a:off x="6306602" y="2084118"/>
+            <a:ext cx="1475115" cy="385948"/>
+          </a:xfrm>
+          <a:prstGeom prst="rect">
+            <a:avLst/>
+          </a:prstGeom>
+        </p:spPr>
+        <p:style>
+          <a:lnRef idx="2">
+            <a:schemeClr val="dk1"/>
+          </a:lnRef>
+          <a:fillRef idx="1">
+            <a:schemeClr val="lt1"/>
+          </a:fillRef>
+          <a:effectRef idx="0">
+            <a:schemeClr val="dk1"/>
+          </a:effectRef>
+          <a:fontRef idx="minor">
+            <a:schemeClr val="dk1"/>
+          </a:fontRef>
+        </p:style>
+        <p:txBody>
+          <a:bodyPr rtlCol="0" anchor="ctr"/>
+          <a:lstStyle/>
+          <a:p>
+            <a:pPr algn="ctr"/>
+            <a:r>
+              <a:rPr lang="en-US" altLang="ko-KR" smtClean="0"/>
+              <a:t>COMMENTS</a:t>
+            </a:r>
+            <a:endParaRPr lang="ko-KR" altLang="en-US"/>
+          </a:p>
+        </p:txBody>
+      </p:sp>
+      <p:cxnSp>
+        <p:nvCxnSpPr>
+          <p:cNvPr id="10" name="직선 연결선 9"/>
+          <p:cNvCxnSpPr>
+            <a:stCxn id="6" idx="3"/>
+            <a:endCxn id="3" idx="1"/>
+          </p:cNvCxnSpPr>
+          <p:nvPr/>
+        </p:nvCxnSpPr>
+        <p:spPr>
+          <a:xfrm>
+            <a:off x="2951018" y="2277092"/>
+            <a:ext cx="1048400" cy="0"/>
+          </a:xfrm>
+          <a:prstGeom prst="line">
+            <a:avLst/>
+          </a:prstGeom>
+          <a:ln w="12700"/>
+        </p:spPr>
+        <p:style>
+          <a:lnRef idx="1">
+            <a:schemeClr val="dk1"/>
+          </a:lnRef>
+          <a:fillRef idx="0">
+            <a:schemeClr val="dk1"/>
+          </a:fillRef>
+          <a:effectRef idx="0">
+            <a:schemeClr val="dk1"/>
+          </a:effectRef>
+          <a:fontRef idx="minor">
+            <a:schemeClr val="tx1"/>
+          </a:fontRef>
+        </p:style>
+      </p:cxnSp>
+      <p:cxnSp>
+        <p:nvCxnSpPr>
+          <p:cNvPr id="11" name="직선 연결선 10"/>
+          <p:cNvCxnSpPr>
+            <a:stCxn id="3" idx="3"/>
+            <a:endCxn id="8" idx="1"/>
+          </p:cNvCxnSpPr>
+          <p:nvPr/>
+        </p:nvCxnSpPr>
+        <p:spPr>
+          <a:xfrm>
+            <a:off x="5258202" y="2277092"/>
+            <a:ext cx="1048400" cy="0"/>
+          </a:xfrm>
+          <a:prstGeom prst="line">
+            <a:avLst/>
+          </a:prstGeom>
+          <a:ln w="12700"/>
+        </p:spPr>
+        <p:style>
+          <a:lnRef idx="1">
+            <a:schemeClr val="dk1"/>
+          </a:lnRef>
+          <a:fillRef idx="0">
+            <a:schemeClr val="dk1"/>
+          </a:fillRef>
+          <a:effectRef idx="0">
+            <a:schemeClr val="dk1"/>
+          </a:effectRef>
+          <a:fontRef idx="minor">
+            <a:schemeClr val="tx1"/>
+          </a:fontRef>
+        </p:style>
+      </p:cxnSp>
+      <p:cxnSp>
+        <p:nvCxnSpPr>
+          <p:cNvPr id="14" name="직선 연결선 13"/>
+          <p:cNvCxnSpPr>
+            <a:stCxn id="8" idx="3"/>
+            <a:endCxn id="7" idx="1"/>
+          </p:cNvCxnSpPr>
+          <p:nvPr/>
+        </p:nvCxnSpPr>
+        <p:spPr>
+          <a:xfrm>
+            <a:off x="7781717" y="2277092"/>
+            <a:ext cx="1048400" cy="0"/>
+          </a:xfrm>
+          <a:prstGeom prst="line">
+            <a:avLst/>
+          </a:prstGeom>
+          <a:ln w="12700"/>
+        </p:spPr>
+        <p:style>
+          <a:lnRef idx="1">
+            <a:schemeClr val="dk1"/>
+          </a:lnRef>
+          <a:fillRef idx="0">
+            <a:schemeClr val="dk1"/>
+          </a:fillRef>
+          <a:effectRef idx="0">
+            <a:schemeClr val="dk1"/>
+          </a:effectRef>
+          <a:fontRef idx="minor">
+            <a:schemeClr val="tx1"/>
+          </a:fontRef>
+        </p:style>
+      </p:cxnSp>
+      <p:sp>
+        <p:nvSpPr>
+          <p:cNvPr id="2" name="직사각형 1"/>
+          <p:cNvSpPr/>
+          <p:nvPr/>
+        </p:nvSpPr>
+        <p:spPr>
+          <a:xfrm>
+            <a:off x="994952" y="2470066"/>
+            <a:ext cx="2437017" cy="896587"/>
+          </a:xfrm>
+          <a:prstGeom prst="rect">
+            <a:avLst/>
+          </a:prstGeom>
+        </p:spPr>
+        <p:style>
+          <a:lnRef idx="2">
+            <a:schemeClr val="dk1"/>
+          </a:lnRef>
+          <a:fillRef idx="1">
+            <a:schemeClr val="lt1"/>
+          </a:fillRef>
+          <a:effectRef idx="0">
+            <a:schemeClr val="dk1"/>
+          </a:effectRef>
+          <a:fontRef idx="minor">
+            <a:schemeClr val="dk1"/>
+          </a:fontRef>
+        </p:style>
+        <p:txBody>
+          <a:bodyPr rtlCol="0" anchor="t"/>
+          <a:lstStyle/>
+          <a:p>
+            <a:r>
+              <a:rPr lang="en-US" altLang="ko-KR" sz="1600" smtClean="0"/>
+              <a:t>member_detail_no (pk)</a:t>
+            </a:r>
+          </a:p>
+          <a:p>
+            <a:r>
+              <a:rPr lang="en-US" altLang="ko-KR" sz="1600"/>
+              <a:t>e</a:t>
+            </a:r>
+            <a:r>
+              <a:rPr lang="en-US" altLang="ko-KR" sz="1600" smtClean="0"/>
+              <a:t>mail_address</a:t>
+            </a:r>
+          </a:p>
+          <a:p>
+            <a:r>
+              <a:rPr lang="en-US" altLang="ko-KR" sz="1600"/>
+              <a:t>p</a:t>
+            </a:r>
+            <a:r>
+              <a:rPr lang="en-US" altLang="ko-KR" sz="1600" smtClean="0"/>
+              <a:t>hone_number</a:t>
+            </a:r>
+          </a:p>
+        </p:txBody>
+      </p:sp>
+      <p:sp>
+        <p:nvSpPr>
+          <p:cNvPr id="12" name="직사각형 11"/>
+          <p:cNvSpPr/>
+          <p:nvPr/>
+        </p:nvSpPr>
+        <p:spPr>
+          <a:xfrm>
+            <a:off x="3999418" y="2470066"/>
+            <a:ext cx="1826233" cy="1650670"/>
+          </a:xfrm>
+          <a:prstGeom prst="rect">
+            <a:avLst/>
+          </a:prstGeom>
+        </p:spPr>
+        <p:style>
+          <a:lnRef idx="2">
+            <a:schemeClr val="dk1"/>
+          </a:lnRef>
+          <a:fillRef idx="1">
+            <a:schemeClr val="lt1"/>
+          </a:fillRef>
+          <a:effectRef idx="0">
+            <a:schemeClr val="dk1"/>
+          </a:effectRef>
+          <a:fontRef idx="minor">
+            <a:schemeClr val="dk1"/>
+          </a:fontRef>
+        </p:style>
+        <p:txBody>
+          <a:bodyPr rtlCol="0" anchor="t"/>
+          <a:lstStyle/>
+          <a:p>
+            <a:r>
+              <a:rPr lang="en-US" altLang="ko-KR" sz="1600" smtClean="0"/>
+              <a:t>member_no (pk)</a:t>
+            </a:r>
+          </a:p>
+          <a:p>
+            <a:r>
+              <a:rPr lang="en-US" altLang="ko-KR" sz="1600" smtClean="0"/>
+              <a:t>member_id</a:t>
+            </a:r>
+          </a:p>
+          <a:p>
+            <a:r>
+              <a:rPr lang="en-US" altLang="ko-KR" sz="1600"/>
+              <a:t>m</a:t>
+            </a:r>
+            <a:r>
+              <a:rPr lang="en-US" altLang="ko-KR" sz="1600" smtClean="0"/>
+              <a:t>ember_pw</a:t>
+            </a:r>
+          </a:p>
+          <a:p>
+            <a:r>
+              <a:rPr lang="en-US" altLang="ko-KR" sz="1600"/>
+              <a:t>n</a:t>
+            </a:r>
+            <a:r>
+              <a:rPr lang="en-US" altLang="ko-KR" sz="1600" smtClean="0"/>
+              <a:t>ame</a:t>
+            </a:r>
+          </a:p>
+          <a:p>
+            <a:r>
+              <a:rPr lang="en-US" altLang="ko-KR" sz="1600" smtClean="0"/>
+              <a:t>register_datetime</a:t>
+            </a:r>
+          </a:p>
+          <a:p>
+            <a:r>
+              <a:rPr lang="en-US" altLang="ko-KR" sz="1600" smtClean="0"/>
+              <a:t>status</a:t>
+            </a:r>
+          </a:p>
+        </p:txBody>
+      </p:sp>
+      <p:sp>
+        <p:nvSpPr>
+          <p:cNvPr id="13" name="직사각형 12"/>
+          <p:cNvSpPr/>
+          <p:nvPr/>
+        </p:nvSpPr>
+        <p:spPr>
+          <a:xfrm>
+            <a:off x="6306602" y="2470066"/>
+            <a:ext cx="1970499" cy="1377537"/>
+          </a:xfrm>
+          <a:prstGeom prst="rect">
+            <a:avLst/>
+          </a:prstGeom>
+        </p:spPr>
+        <p:style>
+          <a:lnRef idx="2">
+            <a:schemeClr val="dk1"/>
+          </a:lnRef>
+          <a:fillRef idx="1">
+            <a:schemeClr val="lt1"/>
+          </a:fillRef>
+          <a:effectRef idx="0">
+            <a:schemeClr val="dk1"/>
+          </a:effectRef>
+          <a:fontRef idx="minor">
+            <a:schemeClr val="dk1"/>
+          </a:fontRef>
+        </p:style>
+        <p:txBody>
+          <a:bodyPr rtlCol="0" anchor="t"/>
+          <a:lstStyle/>
+          <a:p>
+            <a:r>
+              <a:rPr lang="en-US" altLang="ko-KR" sz="1600" smtClean="0"/>
+              <a:t>comments_no (pk)</a:t>
+            </a:r>
+          </a:p>
+          <a:p>
+            <a:r>
+              <a:rPr lang="en-US" altLang="ko-KR" sz="1600"/>
+              <a:t>c</a:t>
+            </a:r>
+            <a:r>
+              <a:rPr lang="en-US" altLang="ko-KR" sz="1600" smtClean="0"/>
+              <a:t>ontents</a:t>
+            </a:r>
+          </a:p>
+          <a:p>
+            <a:r>
+              <a:rPr lang="en-US" altLang="ko-KR" sz="1600"/>
+              <a:t>s</a:t>
+            </a:r>
+            <a:r>
+              <a:rPr lang="en-US" altLang="ko-KR" sz="1600" smtClean="0"/>
+              <a:t>tatus</a:t>
+            </a:r>
+          </a:p>
+          <a:p>
+            <a:r>
+              <a:rPr lang="en-US" altLang="ko-KR" sz="1600"/>
+              <a:t>l</a:t>
+            </a:r>
+            <a:r>
+              <a:rPr lang="en-US" altLang="ko-KR" sz="1600" smtClean="0"/>
+              <a:t>ikes</a:t>
+            </a:r>
+          </a:p>
+          <a:p>
+            <a:r>
+              <a:rPr lang="en-US" altLang="ko-KR" sz="1600" smtClean="0"/>
+              <a:t>register_datetime</a:t>
+            </a:r>
+          </a:p>
+        </p:txBody>
+      </p:sp>
+      <p:sp>
+        <p:nvSpPr>
+          <p:cNvPr id="15" name="직사각형 14"/>
+          <p:cNvSpPr/>
+          <p:nvPr/>
+        </p:nvSpPr>
+        <p:spPr>
+          <a:xfrm>
+            <a:off x="8830117" y="2470066"/>
+            <a:ext cx="1970499" cy="1870364"/>
+          </a:xfrm>
+          <a:prstGeom prst="rect">
+            <a:avLst/>
+          </a:prstGeom>
+        </p:spPr>
+        <p:style>
+          <a:lnRef idx="2">
+            <a:schemeClr val="dk1"/>
+          </a:lnRef>
+          <a:fillRef idx="1">
+            <a:schemeClr val="lt1"/>
+          </a:fillRef>
+          <a:effectRef idx="0">
+            <a:schemeClr val="dk1"/>
+          </a:effectRef>
+          <a:fontRef idx="minor">
+            <a:schemeClr val="dk1"/>
+          </a:fontRef>
+        </p:style>
+        <p:txBody>
+          <a:bodyPr rtlCol="0" anchor="t"/>
+          <a:lstStyle/>
+          <a:p>
+            <a:r>
+              <a:rPr lang="en-US" altLang="ko-KR" sz="1600" smtClean="0"/>
+              <a:t>article_no (pk)</a:t>
+            </a:r>
+          </a:p>
+          <a:p>
+            <a:r>
+              <a:rPr lang="en-US" altLang="ko-KR" sz="1600" smtClean="0"/>
+              <a:t>title</a:t>
+            </a:r>
+          </a:p>
+          <a:p>
+            <a:r>
+              <a:rPr lang="en-US" altLang="ko-KR" sz="1600"/>
+              <a:t>c</a:t>
+            </a:r>
+            <a:r>
+              <a:rPr lang="en-US" altLang="ko-KR" sz="1600" smtClean="0"/>
+              <a:t>ontents</a:t>
+            </a:r>
+          </a:p>
+          <a:p>
+            <a:r>
+              <a:rPr lang="en-US" altLang="ko-KR" sz="1600"/>
+              <a:t>s</a:t>
+            </a:r>
+            <a:r>
+              <a:rPr lang="en-US" altLang="ko-KR" sz="1600" smtClean="0"/>
+              <a:t>tatus</a:t>
+            </a:r>
+          </a:p>
+          <a:p>
+            <a:r>
+              <a:rPr lang="en-US" altLang="ko-KR" sz="1600"/>
+              <a:t>h</a:t>
+            </a:r>
+            <a:r>
+              <a:rPr lang="en-US" altLang="ko-KR" sz="1600" smtClean="0"/>
+              <a:t>its</a:t>
+            </a:r>
+          </a:p>
+          <a:p>
+            <a:r>
+              <a:rPr lang="en-US" altLang="ko-KR" sz="1600"/>
+              <a:t>l</a:t>
+            </a:r>
+            <a:r>
+              <a:rPr lang="en-US" altLang="ko-KR" sz="1600" smtClean="0"/>
+              <a:t>ikes</a:t>
+            </a:r>
+          </a:p>
+          <a:p>
+            <a:r>
+              <a:rPr lang="en-US" altLang="ko-KR" sz="1600" smtClean="0"/>
+              <a:t>register_datetime</a:t>
+            </a:r>
+          </a:p>
+        </p:txBody>
+      </p:sp>
+      <p:cxnSp>
+        <p:nvCxnSpPr>
+          <p:cNvPr id="16" name="직선 연결선 15"/>
+          <p:cNvCxnSpPr/>
+          <p:nvPr/>
+        </p:nvCxnSpPr>
+        <p:spPr>
+          <a:xfrm flipH="1">
+            <a:off x="3076707" y="2170620"/>
+            <a:ext cx="2172" cy="202960"/>
+          </a:xfrm>
+          <a:prstGeom prst="line">
+            <a:avLst/>
+          </a:prstGeom>
+          <a:ln w="12700"/>
+        </p:spPr>
+        <p:style>
+          <a:lnRef idx="1">
+            <a:schemeClr val="dk1"/>
+          </a:lnRef>
+          <a:fillRef idx="0">
+            <a:schemeClr val="dk1"/>
+          </a:fillRef>
+          <a:effectRef idx="0">
+            <a:schemeClr val="dk1"/>
+          </a:effectRef>
+          <a:fontRef idx="minor">
+            <a:schemeClr val="tx1"/>
+          </a:fontRef>
+        </p:style>
+      </p:cxnSp>
+      <p:cxnSp>
+        <p:nvCxnSpPr>
+          <p:cNvPr id="17" name="직선 연결선 16"/>
+          <p:cNvCxnSpPr/>
+          <p:nvPr/>
+        </p:nvCxnSpPr>
+        <p:spPr>
+          <a:xfrm flipH="1">
+            <a:off x="3816181" y="2170620"/>
+            <a:ext cx="2172" cy="202960"/>
+          </a:xfrm>
+          <a:prstGeom prst="line">
+            <a:avLst/>
+          </a:prstGeom>
+          <a:ln w="12700"/>
+        </p:spPr>
+        <p:style>
+          <a:lnRef idx="1">
+            <a:schemeClr val="dk1"/>
+          </a:lnRef>
+          <a:fillRef idx="0">
+            <a:schemeClr val="dk1"/>
+          </a:fillRef>
+          <a:effectRef idx="0">
+            <a:schemeClr val="dk1"/>
+          </a:effectRef>
+          <a:fontRef idx="minor">
+            <a:schemeClr val="tx1"/>
+          </a:fontRef>
+        </p:style>
+      </p:cxnSp>
+      <p:cxnSp>
+        <p:nvCxnSpPr>
+          <p:cNvPr id="18" name="직선 연결선 17"/>
+          <p:cNvCxnSpPr/>
+          <p:nvPr/>
+        </p:nvCxnSpPr>
+        <p:spPr>
+          <a:xfrm flipH="1">
+            <a:off x="5437095" y="2168850"/>
+            <a:ext cx="2172" cy="202960"/>
+          </a:xfrm>
+          <a:prstGeom prst="line">
+            <a:avLst/>
+          </a:prstGeom>
+          <a:ln w="12700"/>
+        </p:spPr>
+        <p:style>
+          <a:lnRef idx="1">
+            <a:schemeClr val="dk1"/>
+          </a:lnRef>
+          <a:fillRef idx="0">
+            <a:schemeClr val="dk1"/>
+          </a:fillRef>
+          <a:effectRef idx="0">
+            <a:schemeClr val="dk1"/>
+          </a:effectRef>
+          <a:fontRef idx="minor">
+            <a:schemeClr val="tx1"/>
+          </a:fontRef>
+        </p:style>
+      </p:cxnSp>
+      <p:cxnSp>
+        <p:nvCxnSpPr>
+          <p:cNvPr id="19" name="직선 연결선 18"/>
+          <p:cNvCxnSpPr/>
+          <p:nvPr/>
+        </p:nvCxnSpPr>
+        <p:spPr>
+          <a:xfrm flipH="1">
+            <a:off x="6125537" y="2175612"/>
+            <a:ext cx="2172" cy="202960"/>
+          </a:xfrm>
+          <a:prstGeom prst="line">
+            <a:avLst/>
+          </a:prstGeom>
+          <a:ln w="12700"/>
+        </p:spPr>
+        <p:style>
+          <a:lnRef idx="1">
+            <a:schemeClr val="dk1"/>
+          </a:lnRef>
+          <a:fillRef idx="0">
+            <a:schemeClr val="dk1"/>
+          </a:fillRef>
+          <a:effectRef idx="0">
+            <a:schemeClr val="dk1"/>
+          </a:effectRef>
+          <a:fontRef idx="minor">
+            <a:schemeClr val="tx1"/>
+          </a:fontRef>
+        </p:style>
+      </p:cxnSp>
+      <p:cxnSp>
+        <p:nvCxnSpPr>
+          <p:cNvPr id="20" name="직선 연결선 19"/>
+          <p:cNvCxnSpPr/>
+          <p:nvPr/>
+        </p:nvCxnSpPr>
+        <p:spPr>
+          <a:xfrm flipH="1">
+            <a:off x="7958438" y="2200185"/>
+            <a:ext cx="2172" cy="202960"/>
+          </a:xfrm>
+          <a:prstGeom prst="line">
+            <a:avLst/>
+          </a:prstGeom>
+          <a:ln w="12700"/>
+        </p:spPr>
+        <p:style>
+          <a:lnRef idx="1">
+            <a:schemeClr val="dk1"/>
+          </a:lnRef>
+          <a:fillRef idx="0">
+            <a:schemeClr val="dk1"/>
+          </a:fillRef>
+          <a:effectRef idx="0">
+            <a:schemeClr val="dk1"/>
+          </a:effectRef>
+          <a:fontRef idx="minor">
+            <a:schemeClr val="tx1"/>
+          </a:fontRef>
+        </p:style>
+      </p:cxnSp>
+      <p:cxnSp>
+        <p:nvCxnSpPr>
+          <p:cNvPr id="21" name="직선 연결선 20"/>
+          <p:cNvCxnSpPr/>
+          <p:nvPr/>
+        </p:nvCxnSpPr>
+        <p:spPr>
+          <a:xfrm flipH="1">
+            <a:off x="8649052" y="2191297"/>
+            <a:ext cx="2172" cy="202960"/>
+          </a:xfrm>
+          <a:prstGeom prst="line">
+            <a:avLst/>
+          </a:prstGeom>
+          <a:ln w="12700"/>
+        </p:spPr>
+        <p:style>
+          <a:lnRef idx="1">
+            <a:schemeClr val="dk1"/>
+          </a:lnRef>
+          <a:fillRef idx="0">
+            <a:schemeClr val="dk1"/>
+          </a:fillRef>
+          <a:effectRef idx="0">
+            <a:schemeClr val="dk1"/>
+          </a:effectRef>
+          <a:fontRef idx="minor">
+            <a:schemeClr val="tx1"/>
+          </a:fontRef>
+        </p:style>
+      </p:cxnSp>
+      <p:cxnSp>
+        <p:nvCxnSpPr>
+          <p:cNvPr id="22" name="직선 연결선 21"/>
+          <p:cNvCxnSpPr/>
+          <p:nvPr/>
+        </p:nvCxnSpPr>
+        <p:spPr>
+          <a:xfrm flipH="1">
+            <a:off x="6125537" y="2142170"/>
+            <a:ext cx="178893" cy="134922"/>
+          </a:xfrm>
+          <a:prstGeom prst="line">
+            <a:avLst/>
+          </a:prstGeom>
+          <a:ln w="12700"/>
+        </p:spPr>
+        <p:style>
+          <a:lnRef idx="1">
+            <a:schemeClr val="dk1"/>
+          </a:lnRef>
+          <a:fillRef idx="0">
+            <a:schemeClr val="dk1"/>
+          </a:fillRef>
+          <a:effectRef idx="0">
+            <a:schemeClr val="dk1"/>
+          </a:effectRef>
+          <a:fontRef idx="minor">
+            <a:schemeClr val="tx1"/>
+          </a:fontRef>
+        </p:style>
+      </p:cxnSp>
+      <p:cxnSp>
+        <p:nvCxnSpPr>
+          <p:cNvPr id="24" name="직선 연결선 23"/>
+          <p:cNvCxnSpPr/>
+          <p:nvPr/>
+        </p:nvCxnSpPr>
+        <p:spPr>
+          <a:xfrm>
+            <a:off x="6125537" y="2269267"/>
+            <a:ext cx="178893" cy="133878"/>
+          </a:xfrm>
+          <a:prstGeom prst="line">
+            <a:avLst/>
+          </a:prstGeom>
+          <a:ln w="12700"/>
+        </p:spPr>
+        <p:style>
+          <a:lnRef idx="1">
+            <a:schemeClr val="dk1"/>
+          </a:lnRef>
+          <a:fillRef idx="0">
+            <a:schemeClr val="dk1"/>
+          </a:fillRef>
+          <a:effectRef idx="0">
+            <a:schemeClr val="dk1"/>
+          </a:effectRef>
+          <a:fontRef idx="minor">
+            <a:schemeClr val="tx1"/>
+          </a:fontRef>
+        </p:style>
+      </p:cxnSp>
+      <p:cxnSp>
+        <p:nvCxnSpPr>
+          <p:cNvPr id="28" name="직선 연결선 27"/>
+          <p:cNvCxnSpPr/>
+          <p:nvPr/>
+        </p:nvCxnSpPr>
+        <p:spPr>
+          <a:xfrm>
+            <a:off x="7779545" y="2151040"/>
+            <a:ext cx="175394" cy="115041"/>
+          </a:xfrm>
+          <a:prstGeom prst="line">
+            <a:avLst/>
+          </a:prstGeom>
+          <a:ln w="12700"/>
+        </p:spPr>
+        <p:style>
+          <a:lnRef idx="1">
+            <a:schemeClr val="dk1"/>
+          </a:lnRef>
+          <a:fillRef idx="0">
+            <a:schemeClr val="dk1"/>
+          </a:fillRef>
+          <a:effectRef idx="0">
+            <a:schemeClr val="dk1"/>
+          </a:effectRef>
+          <a:fontRef idx="minor">
+            <a:schemeClr val="tx1"/>
+          </a:fontRef>
+        </p:style>
+      </p:cxnSp>
+      <p:cxnSp>
+        <p:nvCxnSpPr>
+          <p:cNvPr id="33" name="직선 연결선 32"/>
+          <p:cNvCxnSpPr/>
+          <p:nvPr/>
+        </p:nvCxnSpPr>
+        <p:spPr>
+          <a:xfrm flipH="1">
+            <a:off x="7778883" y="2285218"/>
+            <a:ext cx="183739" cy="117927"/>
+          </a:xfrm>
+          <a:prstGeom prst="line">
+            <a:avLst/>
+          </a:prstGeom>
+          <a:ln w="12700"/>
+        </p:spPr>
+        <p:style>
+          <a:lnRef idx="1">
+            <a:schemeClr val="dk1"/>
+          </a:lnRef>
+          <a:fillRef idx="0">
+            <a:schemeClr val="dk1"/>
+          </a:fillRef>
+          <a:effectRef idx="0">
+            <a:schemeClr val="dk1"/>
+          </a:effectRef>
+          <a:fontRef idx="minor">
+            <a:schemeClr val="tx1"/>
+          </a:fontRef>
+        </p:style>
+      </p:cxnSp>
+    </p:spTree>
+    <p:extLst>
+      <p:ext uri="{BB962C8B-B14F-4D97-AF65-F5344CB8AC3E}">
+        <p14:creationId xmlns:p14="http://schemas.microsoft.com/office/powerpoint/2010/main" val="2033945947"/>
+      </p:ext>
+    </p:extLst>
+  </p:cSld>
+  <p:clrMapOvr>
+    <a:masterClrMapping/>
+  </p:clrMapOvr>
+  <p:timing>
+    <p:tnLst>
+      <p:par>
+        <p:cTn id="1" dur="indefinite" restart="never" nodeType="tmRoot"/>
+      </p:par>
+    </p:tnLst>
+  </p:timing>
+</p:sld>
+</file>
+
+<file path=ppt/slides/slide17.xml><?xml version="1.0" encoding="utf-8"?>
+<p:sld xmlns:a="http://schemas.openxmlformats.org/drawingml/2006/main" xmlns:r="http://schemas.openxmlformats.org/officeDocument/2006/relationships" xmlns:p="http://schemas.openxmlformats.org/presentationml/2006/main">
+  <p:cSld>
+    <p:spTree>
+      <p:nvGrpSpPr>
+        <p:cNvPr id="1" name=""/>
+        <p:cNvGrpSpPr/>
+        <p:nvPr/>
+      </p:nvGrpSpPr>
+      <p:grpSpPr>
+        <a:xfrm>
+          <a:off x="0" y="0"/>
+          <a:ext cx="0" cy="0"/>
+          <a:chOff x="0" y="0"/>
+          <a:chExt cx="0" cy="0"/>
+        </a:xfrm>
+      </p:grpSpPr>
+      <p:sp>
+        <p:nvSpPr>
+          <p:cNvPr id="4" name="TextBox 3"/>
+          <p:cNvSpPr txBox="1"/>
+          <p:nvPr/>
+        </p:nvSpPr>
+        <p:spPr>
+          <a:xfrm>
+            <a:off x="307024" y="307025"/>
+            <a:ext cx="4583306" cy="369332"/>
+          </a:xfrm>
+          <a:prstGeom prst="rect">
+            <a:avLst/>
+          </a:prstGeom>
+          <a:noFill/>
+        </p:spPr>
+        <p:txBody>
+          <a:bodyPr wrap="none" rtlCol="0">
+            <a:spAutoFit/>
+          </a:bodyPr>
+          <a:lstStyle/>
+          <a:p>
+            <a:r>
+              <a:rPr lang="ko-KR" altLang="en-US" smtClean="0"/>
+              <a:t>네번째 실습</a:t>
+            </a:r>
+            <a:r>
+              <a:rPr lang="en-US" altLang="ko-KR" smtClean="0"/>
+              <a:t>, </a:t>
+            </a:r>
+            <a:r>
+              <a:rPr lang="ko-KR" altLang="en-US" smtClean="0"/>
+              <a:t>더 복잡해진 관계 </a:t>
+            </a:r>
+            <a:r>
+              <a:rPr lang="en-US" altLang="ko-KR" smtClean="0"/>
+              <a:t>(UML </a:t>
+            </a:r>
+            <a:r>
+              <a:rPr lang="ko-KR" altLang="en-US" smtClean="0"/>
+              <a:t>상세</a:t>
+            </a:r>
+            <a:r>
+              <a:rPr lang="en-US" altLang="ko-KR" smtClean="0"/>
+              <a:t>)</a:t>
+            </a:r>
+            <a:endParaRPr lang="ko-KR" altLang="en-US"/>
+          </a:p>
+        </p:txBody>
+      </p:sp>
+      <p:sp>
+        <p:nvSpPr>
+          <p:cNvPr id="3" name="직사각형 2"/>
+          <p:cNvSpPr/>
+          <p:nvPr/>
+        </p:nvSpPr>
+        <p:spPr>
+          <a:xfrm>
+            <a:off x="3559471" y="2101928"/>
+            <a:ext cx="1258784" cy="385948"/>
+          </a:xfrm>
+          <a:prstGeom prst="rect">
+            <a:avLst/>
+          </a:prstGeom>
+        </p:spPr>
+        <p:style>
+          <a:lnRef idx="2">
+            <a:schemeClr val="dk1"/>
+          </a:lnRef>
+          <a:fillRef idx="1">
+            <a:schemeClr val="lt1"/>
+          </a:fillRef>
+          <a:effectRef idx="0">
+            <a:schemeClr val="dk1"/>
+          </a:effectRef>
+          <a:fontRef idx="minor">
+            <a:schemeClr val="dk1"/>
+          </a:fontRef>
+        </p:style>
+        <p:txBody>
+          <a:bodyPr rtlCol="0" anchor="ctr"/>
+          <a:lstStyle/>
+          <a:p>
+            <a:pPr algn="ctr"/>
+            <a:r>
+              <a:rPr lang="en-US" altLang="ko-KR" smtClean="0"/>
+              <a:t>Member</a:t>
+            </a:r>
+            <a:endParaRPr lang="ko-KR" altLang="en-US"/>
+          </a:p>
+        </p:txBody>
+      </p:sp>
+      <p:sp>
+        <p:nvSpPr>
+          <p:cNvPr id="6" name="직사각형 5"/>
+          <p:cNvSpPr/>
+          <p:nvPr/>
+        </p:nvSpPr>
+        <p:spPr>
+          <a:xfrm>
+            <a:off x="721259" y="2101928"/>
+            <a:ext cx="1843250" cy="385948"/>
+          </a:xfrm>
+          <a:prstGeom prst="rect">
+            <a:avLst/>
+          </a:prstGeom>
+        </p:spPr>
+        <p:style>
+          <a:lnRef idx="2">
+            <a:schemeClr val="dk1"/>
+          </a:lnRef>
+          <a:fillRef idx="1">
+            <a:schemeClr val="lt1"/>
+          </a:fillRef>
+          <a:effectRef idx="0">
+            <a:schemeClr val="dk1"/>
+          </a:effectRef>
+          <a:fontRef idx="minor">
+            <a:schemeClr val="dk1"/>
+          </a:fontRef>
+        </p:style>
+        <p:txBody>
+          <a:bodyPr rtlCol="0" anchor="ctr"/>
+          <a:lstStyle/>
+          <a:p>
+            <a:pPr algn="ctr"/>
+            <a:r>
+              <a:rPr lang="en-US" altLang="ko-KR" smtClean="0"/>
+              <a:t>MemberDetail</a:t>
+            </a:r>
+            <a:endParaRPr lang="ko-KR" altLang="en-US"/>
+          </a:p>
+        </p:txBody>
+      </p:sp>
+      <p:sp>
+        <p:nvSpPr>
+          <p:cNvPr id="7" name="직사각형 6"/>
+          <p:cNvSpPr/>
+          <p:nvPr/>
+        </p:nvSpPr>
+        <p:spPr>
+          <a:xfrm>
+            <a:off x="9388419" y="2101928"/>
+            <a:ext cx="1258784" cy="385948"/>
+          </a:xfrm>
+          <a:prstGeom prst="rect">
+            <a:avLst/>
+          </a:prstGeom>
+        </p:spPr>
+        <p:style>
+          <a:lnRef idx="2">
+            <a:schemeClr val="dk1"/>
+          </a:lnRef>
+          <a:fillRef idx="1">
+            <a:schemeClr val="lt1"/>
+          </a:fillRef>
+          <a:effectRef idx="0">
+            <a:schemeClr val="dk1"/>
+          </a:effectRef>
+          <a:fontRef idx="minor">
+            <a:schemeClr val="dk1"/>
+          </a:fontRef>
+        </p:style>
+        <p:txBody>
+          <a:bodyPr rtlCol="0" anchor="ctr"/>
+          <a:lstStyle/>
+          <a:p>
+            <a:pPr algn="ctr"/>
+            <a:r>
+              <a:rPr lang="en-US" altLang="ko-KR" smtClean="0"/>
+              <a:t>Article</a:t>
+            </a:r>
+            <a:endParaRPr lang="ko-KR" altLang="en-US"/>
+          </a:p>
+        </p:txBody>
+      </p:sp>
+      <p:sp>
+        <p:nvSpPr>
+          <p:cNvPr id="8" name="직사각형 7"/>
+          <p:cNvSpPr/>
+          <p:nvPr/>
+        </p:nvSpPr>
+        <p:spPr>
+          <a:xfrm>
+            <a:off x="6399824" y="2101928"/>
+            <a:ext cx="1475115" cy="385948"/>
+          </a:xfrm>
+          <a:prstGeom prst="rect">
+            <a:avLst/>
+          </a:prstGeom>
+        </p:spPr>
+        <p:style>
+          <a:lnRef idx="2">
+            <a:schemeClr val="dk1"/>
+          </a:lnRef>
+          <a:fillRef idx="1">
+            <a:schemeClr val="lt1"/>
+          </a:fillRef>
+          <a:effectRef idx="0">
+            <a:schemeClr val="dk1"/>
+          </a:effectRef>
+          <a:fontRef idx="minor">
+            <a:schemeClr val="dk1"/>
+          </a:fontRef>
+        </p:style>
+        <p:txBody>
+          <a:bodyPr rtlCol="0" anchor="ctr"/>
+          <a:lstStyle/>
+          <a:p>
+            <a:pPr algn="ctr"/>
+            <a:r>
+              <a:rPr lang="en-US" altLang="ko-KR" smtClean="0"/>
+              <a:t>Comments</a:t>
+            </a:r>
+            <a:endParaRPr lang="ko-KR" altLang="en-US"/>
+          </a:p>
+        </p:txBody>
+      </p:sp>
+      <p:cxnSp>
+        <p:nvCxnSpPr>
+          <p:cNvPr id="10" name="직선 연결선 9"/>
+          <p:cNvCxnSpPr>
+            <a:stCxn id="6" idx="3"/>
+            <a:endCxn id="3" idx="1"/>
+          </p:cNvCxnSpPr>
+          <p:nvPr/>
+        </p:nvCxnSpPr>
+        <p:spPr>
+          <a:xfrm>
+            <a:off x="2564509" y="2294902"/>
+            <a:ext cx="994962" cy="0"/>
+          </a:xfrm>
+          <a:prstGeom prst="line">
+            <a:avLst/>
+          </a:prstGeom>
+          <a:ln w="12700"/>
+        </p:spPr>
+        <p:style>
+          <a:lnRef idx="1">
+            <a:schemeClr val="dk1"/>
+          </a:lnRef>
+          <a:fillRef idx="0">
+            <a:schemeClr val="dk1"/>
+          </a:fillRef>
+          <a:effectRef idx="0">
+            <a:schemeClr val="dk1"/>
+          </a:effectRef>
+          <a:fontRef idx="minor">
+            <a:schemeClr val="tx1"/>
+          </a:fontRef>
+        </p:style>
+      </p:cxnSp>
+      <p:cxnSp>
+        <p:nvCxnSpPr>
+          <p:cNvPr id="11" name="직선 연결선 10"/>
+          <p:cNvCxnSpPr>
+            <a:stCxn id="3" idx="3"/>
+            <a:endCxn id="8" idx="1"/>
+          </p:cNvCxnSpPr>
+          <p:nvPr/>
+        </p:nvCxnSpPr>
+        <p:spPr>
+          <a:xfrm>
+            <a:off x="4818255" y="2294902"/>
+            <a:ext cx="1581569" cy="0"/>
+          </a:xfrm>
+          <a:prstGeom prst="line">
+            <a:avLst/>
+          </a:prstGeom>
+          <a:ln w="12700"/>
+        </p:spPr>
+        <p:style>
+          <a:lnRef idx="1">
+            <a:schemeClr val="dk1"/>
+          </a:lnRef>
+          <a:fillRef idx="0">
+            <a:schemeClr val="dk1"/>
+          </a:fillRef>
+          <a:effectRef idx="0">
+            <a:schemeClr val="dk1"/>
+          </a:effectRef>
+          <a:fontRef idx="minor">
+            <a:schemeClr val="tx1"/>
+          </a:fontRef>
+        </p:style>
+      </p:cxnSp>
+      <p:cxnSp>
+        <p:nvCxnSpPr>
+          <p:cNvPr id="14" name="직선 연결선 13"/>
+          <p:cNvCxnSpPr>
+            <a:stCxn id="8" idx="3"/>
+            <a:endCxn id="7" idx="1"/>
+          </p:cNvCxnSpPr>
+          <p:nvPr/>
+        </p:nvCxnSpPr>
+        <p:spPr>
+          <a:xfrm>
+            <a:off x="7874939" y="2294902"/>
+            <a:ext cx="1513480" cy="0"/>
+          </a:xfrm>
+          <a:prstGeom prst="line">
+            <a:avLst/>
+          </a:prstGeom>
+          <a:ln w="12700"/>
+        </p:spPr>
+        <p:style>
+          <a:lnRef idx="1">
+            <a:schemeClr val="dk1"/>
+          </a:lnRef>
+          <a:fillRef idx="0">
+            <a:schemeClr val="dk1"/>
+          </a:fillRef>
+          <a:effectRef idx="0">
+            <a:schemeClr val="dk1"/>
+          </a:effectRef>
+          <a:fontRef idx="minor">
+            <a:schemeClr val="tx1"/>
+          </a:fontRef>
+        </p:style>
+      </p:cxnSp>
+      <p:sp>
+        <p:nvSpPr>
+          <p:cNvPr id="2" name="직사각형 1"/>
+          <p:cNvSpPr/>
+          <p:nvPr/>
+        </p:nvSpPr>
+        <p:spPr>
+          <a:xfrm>
+            <a:off x="721258" y="2487876"/>
+            <a:ext cx="2324202" cy="896587"/>
+          </a:xfrm>
+          <a:prstGeom prst="rect">
+            <a:avLst/>
+          </a:prstGeom>
+        </p:spPr>
+        <p:style>
+          <a:lnRef idx="2">
+            <a:schemeClr val="dk1"/>
+          </a:lnRef>
+          <a:fillRef idx="1">
+            <a:schemeClr val="lt1"/>
+          </a:fillRef>
+          <a:effectRef idx="0">
+            <a:schemeClr val="dk1"/>
+          </a:effectRef>
+          <a:fontRef idx="minor">
+            <a:schemeClr val="dk1"/>
+          </a:fontRef>
+        </p:style>
+        <p:txBody>
+          <a:bodyPr rtlCol="0" anchor="t"/>
+          <a:lstStyle/>
+          <a:p>
+            <a:r>
+              <a:rPr lang="en-US" altLang="ko-KR" sz="1600" smtClean="0"/>
+              <a:t>memberDetailNo : int</a:t>
+            </a:r>
+          </a:p>
+          <a:p>
+            <a:r>
+              <a:rPr lang="en-US" altLang="ko-KR" sz="1600" smtClean="0"/>
+              <a:t>emailAddress : String</a:t>
+            </a:r>
+          </a:p>
+          <a:p>
+            <a:r>
+              <a:rPr lang="en-US" altLang="ko-KR" sz="1600" smtClean="0"/>
+              <a:t>phoneNumber : String</a:t>
+            </a:r>
+          </a:p>
+        </p:txBody>
+      </p:sp>
+      <p:sp>
+        <p:nvSpPr>
+          <p:cNvPr id="12" name="직사각형 11"/>
+          <p:cNvSpPr/>
+          <p:nvPr/>
+        </p:nvSpPr>
+        <p:spPr>
+          <a:xfrm>
+            <a:off x="3559471" y="2487876"/>
+            <a:ext cx="2366863" cy="1650670"/>
+          </a:xfrm>
+          <a:prstGeom prst="rect">
+            <a:avLst/>
+          </a:prstGeom>
+        </p:spPr>
+        <p:style>
+          <a:lnRef idx="2">
+            <a:schemeClr val="dk1"/>
+          </a:lnRef>
+          <a:fillRef idx="1">
+            <a:schemeClr val="lt1"/>
+          </a:fillRef>
+          <a:effectRef idx="0">
+            <a:schemeClr val="dk1"/>
+          </a:effectRef>
+          <a:fontRef idx="minor">
+            <a:schemeClr val="dk1"/>
+          </a:fontRef>
+        </p:style>
+        <p:txBody>
+          <a:bodyPr rtlCol="0" anchor="t"/>
+          <a:lstStyle/>
+          <a:p>
+            <a:r>
+              <a:rPr lang="en-US" altLang="ko-KR" sz="1600" smtClean="0"/>
+              <a:t>memberNo : int</a:t>
+            </a:r>
+          </a:p>
+          <a:p>
+            <a:r>
+              <a:rPr lang="en-US" altLang="ko-KR" sz="1600" smtClean="0"/>
+              <a:t>memberId : String</a:t>
+            </a:r>
+          </a:p>
+          <a:p>
+            <a:r>
+              <a:rPr lang="en-US" altLang="ko-KR" sz="1600" smtClean="0"/>
+              <a:t>memberPw : String</a:t>
+            </a:r>
+          </a:p>
+          <a:p>
+            <a:r>
+              <a:rPr lang="en-US" altLang="ko-KR" sz="1600" smtClean="0"/>
+              <a:t>name : String</a:t>
+            </a:r>
+          </a:p>
+          <a:p>
+            <a:r>
+              <a:rPr lang="en-US" altLang="ko-KR" sz="1600" smtClean="0"/>
+              <a:t>registerDatetime : Date</a:t>
+            </a:r>
+          </a:p>
+          <a:p>
+            <a:r>
+              <a:rPr lang="en-US" altLang="ko-KR" sz="1600" smtClean="0"/>
+              <a:t>status : MemberStatus</a:t>
+            </a:r>
+          </a:p>
+        </p:txBody>
+      </p:sp>
+      <p:sp>
+        <p:nvSpPr>
+          <p:cNvPr id="13" name="직사각형 12"/>
+          <p:cNvSpPr/>
+          <p:nvPr/>
+        </p:nvSpPr>
+        <p:spPr>
+          <a:xfrm>
+            <a:off x="6399824" y="2487876"/>
+            <a:ext cx="2463629" cy="1377537"/>
+          </a:xfrm>
+          <a:prstGeom prst="rect">
+            <a:avLst/>
+          </a:prstGeom>
+        </p:spPr>
+        <p:style>
+          <a:lnRef idx="2">
+            <a:schemeClr val="dk1"/>
+          </a:lnRef>
+          <a:fillRef idx="1">
+            <a:schemeClr val="lt1"/>
+          </a:fillRef>
+          <a:effectRef idx="0">
+            <a:schemeClr val="dk1"/>
+          </a:effectRef>
+          <a:fontRef idx="minor">
+            <a:schemeClr val="dk1"/>
+          </a:fontRef>
+        </p:style>
+        <p:txBody>
+          <a:bodyPr rtlCol="0" anchor="t"/>
+          <a:lstStyle/>
+          <a:p>
+            <a:r>
+              <a:rPr lang="en-US" altLang="ko-KR" sz="1600" smtClean="0"/>
+              <a:t>commentsNo : int</a:t>
+            </a:r>
+          </a:p>
+          <a:p>
+            <a:r>
+              <a:rPr lang="en-US" altLang="ko-KR" sz="1600" smtClean="0"/>
+              <a:t>contents : String</a:t>
+            </a:r>
+          </a:p>
+          <a:p>
+            <a:r>
+              <a:rPr lang="en-US" altLang="ko-KR" sz="1600" smtClean="0"/>
+              <a:t>status : CommentsStatus</a:t>
+            </a:r>
+          </a:p>
+          <a:p>
+            <a:r>
+              <a:rPr lang="en-US" altLang="ko-KR" sz="1600" smtClean="0"/>
+              <a:t>likes : int</a:t>
+            </a:r>
+          </a:p>
+          <a:p>
+            <a:r>
+              <a:rPr lang="en-US" altLang="ko-KR" sz="1600" smtClean="0"/>
+              <a:t>registerDatetime : Date</a:t>
+            </a:r>
+          </a:p>
+        </p:txBody>
+      </p:sp>
+      <p:sp>
+        <p:nvSpPr>
+          <p:cNvPr id="15" name="직사각형 14"/>
+          <p:cNvSpPr/>
+          <p:nvPr/>
+        </p:nvSpPr>
+        <p:spPr>
+          <a:xfrm>
+            <a:off x="9388419" y="2487876"/>
+            <a:ext cx="2374085" cy="1870364"/>
+          </a:xfrm>
+          <a:prstGeom prst="rect">
+            <a:avLst/>
+          </a:prstGeom>
+        </p:spPr>
+        <p:style>
+          <a:lnRef idx="2">
+            <a:schemeClr val="dk1"/>
+          </a:lnRef>
+          <a:fillRef idx="1">
+            <a:schemeClr val="lt1"/>
+          </a:fillRef>
+          <a:effectRef idx="0">
+            <a:schemeClr val="dk1"/>
+          </a:effectRef>
+          <a:fontRef idx="minor">
+            <a:schemeClr val="dk1"/>
+          </a:fontRef>
+        </p:style>
+        <p:txBody>
+          <a:bodyPr rtlCol="0" anchor="t"/>
+          <a:lstStyle/>
+          <a:p>
+            <a:r>
+              <a:rPr lang="en-US" altLang="ko-KR" sz="1600" smtClean="0"/>
+              <a:t>articleNo : int</a:t>
+            </a:r>
+          </a:p>
+          <a:p>
+            <a:r>
+              <a:rPr lang="en-US" altLang="ko-KR" sz="1600" smtClean="0"/>
+              <a:t>title : String</a:t>
+            </a:r>
+          </a:p>
+          <a:p>
+            <a:r>
+              <a:rPr lang="en-US" altLang="ko-KR" sz="1600" smtClean="0"/>
+              <a:t>contents : String</a:t>
+            </a:r>
+          </a:p>
+          <a:p>
+            <a:r>
+              <a:rPr lang="en-US" altLang="ko-KR" sz="1600"/>
+              <a:t>s</a:t>
+            </a:r>
+            <a:r>
+              <a:rPr lang="en-US" altLang="ko-KR" sz="1600" smtClean="0"/>
+              <a:t>tatus : ArticleStatus</a:t>
+            </a:r>
+          </a:p>
+          <a:p>
+            <a:r>
+              <a:rPr lang="en-US" altLang="ko-KR" sz="1600"/>
+              <a:t>h</a:t>
+            </a:r>
+            <a:r>
+              <a:rPr lang="en-US" altLang="ko-KR" sz="1600" smtClean="0"/>
+              <a:t>its : int</a:t>
+            </a:r>
+          </a:p>
+          <a:p>
+            <a:r>
+              <a:rPr lang="en-US" altLang="ko-KR" sz="1600"/>
+              <a:t>l</a:t>
+            </a:r>
+            <a:r>
+              <a:rPr lang="en-US" altLang="ko-KR" sz="1600" smtClean="0"/>
+              <a:t>ikes : int</a:t>
+            </a:r>
+          </a:p>
+          <a:p>
+            <a:r>
+              <a:rPr lang="en-US" altLang="ko-KR" sz="1600" smtClean="0"/>
+              <a:t>registerDatetime : Date</a:t>
+            </a:r>
+          </a:p>
+        </p:txBody>
+      </p:sp>
+      <p:sp>
+        <p:nvSpPr>
+          <p:cNvPr id="25" name="직사각형 24"/>
+          <p:cNvSpPr/>
+          <p:nvPr/>
+        </p:nvSpPr>
+        <p:spPr>
+          <a:xfrm>
+            <a:off x="3559471" y="4524494"/>
+            <a:ext cx="1959990" cy="522514"/>
+          </a:xfrm>
+          <a:prstGeom prst="rect">
+            <a:avLst/>
+          </a:prstGeom>
+        </p:spPr>
+        <p:style>
+          <a:lnRef idx="2">
+            <a:schemeClr val="dk1"/>
+          </a:lnRef>
+          <a:fillRef idx="1">
+            <a:schemeClr val="lt1"/>
+          </a:fillRef>
+          <a:effectRef idx="0">
+            <a:schemeClr val="dk1"/>
+          </a:effectRef>
+          <a:fontRef idx="minor">
+            <a:schemeClr val="dk1"/>
+          </a:fontRef>
+        </p:style>
+        <p:txBody>
+          <a:bodyPr rtlCol="0" anchor="ctr"/>
+          <a:lstStyle/>
+          <a:p>
+            <a:pPr algn="ctr"/>
+            <a:r>
+              <a:rPr lang="en-US" altLang="ko-KR" sz="1100" smtClean="0"/>
+              <a:t>(enum)</a:t>
+            </a:r>
+          </a:p>
+          <a:p>
+            <a:pPr algn="ctr"/>
+            <a:r>
+              <a:rPr lang="en-US" altLang="ko-KR" smtClean="0"/>
+              <a:t>MemberStatus</a:t>
+            </a:r>
+            <a:endParaRPr lang="ko-KR" altLang="en-US"/>
+          </a:p>
+        </p:txBody>
+      </p:sp>
+      <p:sp>
+        <p:nvSpPr>
+          <p:cNvPr id="26" name="직사각형 25"/>
+          <p:cNvSpPr/>
+          <p:nvPr/>
+        </p:nvSpPr>
+        <p:spPr>
+          <a:xfrm>
+            <a:off x="6399824" y="4524494"/>
+            <a:ext cx="1959990" cy="522514"/>
+          </a:xfrm>
+          <a:prstGeom prst="rect">
+            <a:avLst/>
+          </a:prstGeom>
+        </p:spPr>
+        <p:style>
+          <a:lnRef idx="2">
+            <a:schemeClr val="dk1"/>
+          </a:lnRef>
+          <a:fillRef idx="1">
+            <a:schemeClr val="lt1"/>
+          </a:fillRef>
+          <a:effectRef idx="0">
+            <a:schemeClr val="dk1"/>
+          </a:effectRef>
+          <a:fontRef idx="minor">
+            <a:schemeClr val="dk1"/>
+          </a:fontRef>
+        </p:style>
+        <p:txBody>
+          <a:bodyPr rtlCol="0" anchor="ctr"/>
+          <a:lstStyle/>
+          <a:p>
+            <a:pPr algn="ctr"/>
+            <a:r>
+              <a:rPr lang="en-US" altLang="ko-KR" sz="1100" smtClean="0"/>
+              <a:t>(enum)</a:t>
+            </a:r>
+          </a:p>
+          <a:p>
+            <a:pPr algn="ctr"/>
+            <a:r>
+              <a:rPr lang="en-US" altLang="ko-KR" smtClean="0"/>
+              <a:t>CommentsStatus</a:t>
+            </a:r>
+            <a:endParaRPr lang="ko-KR" altLang="en-US"/>
+          </a:p>
+        </p:txBody>
+      </p:sp>
+      <p:sp>
+        <p:nvSpPr>
+          <p:cNvPr id="27" name="직사각형 26"/>
+          <p:cNvSpPr/>
+          <p:nvPr/>
+        </p:nvSpPr>
+        <p:spPr>
+          <a:xfrm>
+            <a:off x="9388419" y="4524494"/>
+            <a:ext cx="1959990" cy="522514"/>
+          </a:xfrm>
+          <a:prstGeom prst="rect">
+            <a:avLst/>
+          </a:prstGeom>
+        </p:spPr>
+        <p:style>
+          <a:lnRef idx="2">
+            <a:schemeClr val="dk1"/>
+          </a:lnRef>
+          <a:fillRef idx="1">
+            <a:schemeClr val="lt1"/>
+          </a:fillRef>
+          <a:effectRef idx="0">
+            <a:schemeClr val="dk1"/>
+          </a:effectRef>
+          <a:fontRef idx="minor">
+            <a:schemeClr val="dk1"/>
+          </a:fontRef>
+        </p:style>
+        <p:txBody>
+          <a:bodyPr rtlCol="0" anchor="ctr"/>
+          <a:lstStyle/>
+          <a:p>
+            <a:pPr algn="ctr"/>
+            <a:r>
+              <a:rPr lang="en-US" altLang="ko-KR" sz="1100" smtClean="0"/>
+              <a:t>(enum)</a:t>
+            </a:r>
+          </a:p>
+          <a:p>
+            <a:pPr algn="ctr"/>
+            <a:r>
+              <a:rPr lang="en-US" altLang="ko-KR" smtClean="0"/>
+              <a:t>ArticleStatus</a:t>
+            </a:r>
+            <a:endParaRPr lang="ko-KR" altLang="en-US"/>
+          </a:p>
+        </p:txBody>
+      </p:sp>
+    </p:spTree>
+    <p:extLst>
+      <p:ext uri="{BB962C8B-B14F-4D97-AF65-F5344CB8AC3E}">
+        <p14:creationId xmlns:p14="http://schemas.microsoft.com/office/powerpoint/2010/main" val="1962915151"/>
+      </p:ext>
+    </p:extLst>
+  </p:cSld>
+  <p:clrMapOvr>
+    <a:masterClrMapping/>
+  </p:clrMapOvr>
+  <p:timing>
+    <p:tnLst>
+      <p:par>
+        <p:cTn id="1" dur="indefinite" restart="never" nodeType="tmRoot"/>
+      </p:par>
+    </p:tnLst>
+  </p:timing>
+</p:sld>
+</file>
+
+<file path=ppt/slides/slide18.xml><?xml version="1.0" encoding="utf-8"?>
+<p:sld xmlns:a="http://schemas.openxmlformats.org/drawingml/2006/main" xmlns:r="http://schemas.openxmlformats.org/officeDocument/2006/relationships" xmlns:p="http://schemas.openxmlformats.org/presentationml/2006/main">
+  <p:cSld>
+    <p:spTree>
+      <p:nvGrpSpPr>
+        <p:cNvPr id="1" name=""/>
+        <p:cNvGrpSpPr/>
+        <p:nvPr/>
+      </p:nvGrpSpPr>
+      <p:grpSpPr>
+        <a:xfrm>
+          <a:off x="0" y="0"/>
+          <a:ext cx="0" cy="0"/>
+          <a:chOff x="0" y="0"/>
+          <a:chExt cx="0" cy="0"/>
+        </a:xfrm>
+      </p:grpSpPr>
+      <p:sp>
+        <p:nvSpPr>
+          <p:cNvPr id="4" name="TextBox 3"/>
+          <p:cNvSpPr txBox="1"/>
+          <p:nvPr/>
+        </p:nvSpPr>
+        <p:spPr>
+          <a:xfrm>
+            <a:off x="307024" y="307025"/>
+            <a:ext cx="3332964" cy="369332"/>
+          </a:xfrm>
+          <a:prstGeom prst="rect">
+            <a:avLst/>
+          </a:prstGeom>
+          <a:noFill/>
+        </p:spPr>
+        <p:txBody>
+          <a:bodyPr wrap="none" rtlCol="0">
+            <a:spAutoFit/>
+          </a:bodyPr>
+          <a:lstStyle/>
+          <a:p>
+            <a:r>
+              <a:rPr lang="ko-KR" altLang="en-US" smtClean="0"/>
+              <a:t>네번째 실습</a:t>
+            </a:r>
+            <a:r>
+              <a:rPr lang="en-US" altLang="ko-KR" smtClean="0"/>
+              <a:t>, </a:t>
+            </a:r>
+            <a:r>
+              <a:rPr lang="ko-KR" altLang="en-US" smtClean="0"/>
+              <a:t>더 복잡해진 관계</a:t>
+            </a:r>
+            <a:endParaRPr lang="ko-KR" altLang="en-US"/>
+          </a:p>
+        </p:txBody>
+      </p:sp>
+      <p:sp>
+        <p:nvSpPr>
+          <p:cNvPr id="17" name="TextBox 16"/>
+          <p:cNvSpPr txBox="1"/>
+          <p:nvPr/>
+        </p:nvSpPr>
+        <p:spPr>
+          <a:xfrm>
+            <a:off x="4493127" y="3023528"/>
+            <a:ext cx="3113353" cy="338554"/>
+          </a:xfrm>
+          <a:prstGeom prst="rect">
+            <a:avLst/>
+          </a:prstGeom>
+          <a:noFill/>
+        </p:spPr>
+        <p:txBody>
+          <a:bodyPr wrap="none" rtlCol="0">
+            <a:spAutoFit/>
+          </a:bodyPr>
+          <a:lstStyle/>
+          <a:p>
+            <a:r>
+              <a:rPr lang="ko-KR" altLang="en-US" sz="1600" b="1" i="1" u="sng" smtClean="0">
+                <a:solidFill>
+                  <a:srgbClr val="FF0000"/>
+                </a:solidFill>
+              </a:rPr>
+              <a:t>소스를 통해 설명 드리겠습니다</a:t>
+            </a:r>
+            <a:r>
+              <a:rPr lang="en-US" altLang="ko-KR" sz="1600" b="1" i="1" u="sng" smtClean="0">
+                <a:solidFill>
+                  <a:srgbClr val="FF0000"/>
+                </a:solidFill>
+              </a:rPr>
+              <a:t>.</a:t>
+            </a:r>
+          </a:p>
+        </p:txBody>
+      </p:sp>
+    </p:spTree>
+    <p:extLst>
+      <p:ext uri="{BB962C8B-B14F-4D97-AF65-F5344CB8AC3E}">
+        <p14:creationId xmlns:p14="http://schemas.microsoft.com/office/powerpoint/2010/main" val="2401398644"/>
+      </p:ext>
+    </p:extLst>
+  </p:cSld>
+  <p:clrMapOvr>
+    <a:masterClrMapping/>
+  </p:clrMapOvr>
+  <p:timing>
+    <p:tnLst>
+      <p:par>
+        <p:cTn id="1" dur="indefinite" restart="never" nodeType="tmRoot"/>
+      </p:par>
+    </p:tnLst>
+  </p:timing>
+</p:sld>
+</file>
+
+<file path=ppt/slides/slide19.xml><?xml version="1.0" encoding="utf-8"?>
 <p:sld xmlns:a="http://schemas.openxmlformats.org/drawingml/2006/main" xmlns:r="http://schemas.openxmlformats.org/officeDocument/2006/relationships" xmlns:p="http://schemas.openxmlformats.org/presentationml/2006/main">
   <p:cSld>
     <p:spTree>

</xml_diff>